<commit_message>
Add picture geometry getter test
</commit_message>
<xml_diff>
--- a/test/ShapeCrawler.Tests.Unit/Assets/059_crop-images.pptx
+++ b/test/ShapeCrawler.Tests.Unit/Assets/059_crop-images.pptx
@@ -122,12 +122,12 @@
             <a:srgbClr val="A4A3A4"/>
           </p15:clr>
         </p15:guide>
-        <p15:guide id="4" pos="3984" userDrawn="1">
+        <p15:guide id="4" pos="3840" userDrawn="1">
           <p15:clr>
             <a:srgbClr val="A4A3A4"/>
           </p15:clr>
         </p15:guide>
-        <p15:guide id="5" pos="4560" userDrawn="1">
+        <p15:guide id="5" pos="5568" userDrawn="1">
           <p15:clr>
             <a:srgbClr val="A4A3A4"/>
           </p15:clr>
@@ -147,7 +147,7 @@
             <a:srgbClr val="A4A3A4"/>
           </p15:clr>
         </p15:guide>
-        <p15:guide id="9" pos="4848" userDrawn="1">
+        <p15:guide id="9" pos="2400" userDrawn="1">
           <p15:clr>
             <a:srgbClr val="A4A3A4"/>
           </p15:clr>
@@ -305,7 +305,7 @@
           <a:p>
             <a:fld id="{1ABA7A20-74C4-4F60-84AA-106035A12838}" type="datetimeFigureOut">
               <a:rPr lang="en-US" smtClean="0"/>
-              <a:t>12/13/2024</a:t>
+              <a:t>12/16/2024</a:t>
             </a:fld>
             <a:endParaRPr lang="en-US"/>
           </a:p>
@@ -503,7 +503,7 @@
           <a:p>
             <a:fld id="{1ABA7A20-74C4-4F60-84AA-106035A12838}" type="datetimeFigureOut">
               <a:rPr lang="en-US" smtClean="0"/>
-              <a:t>12/13/2024</a:t>
+              <a:t>12/16/2024</a:t>
             </a:fld>
             <a:endParaRPr lang="en-US"/>
           </a:p>
@@ -711,7 +711,7 @@
           <a:p>
             <a:fld id="{1ABA7A20-74C4-4F60-84AA-106035A12838}" type="datetimeFigureOut">
               <a:rPr lang="en-US" smtClean="0"/>
-              <a:t>12/13/2024</a:t>
+              <a:t>12/16/2024</a:t>
             </a:fld>
             <a:endParaRPr lang="en-US"/>
           </a:p>
@@ -909,7 +909,7 @@
           <a:p>
             <a:fld id="{1ABA7A20-74C4-4F60-84AA-106035A12838}" type="datetimeFigureOut">
               <a:rPr lang="en-US" smtClean="0"/>
-              <a:t>12/13/2024</a:t>
+              <a:t>12/16/2024</a:t>
             </a:fld>
             <a:endParaRPr lang="en-US"/>
           </a:p>
@@ -1184,7 +1184,7 @@
           <a:p>
             <a:fld id="{1ABA7A20-74C4-4F60-84AA-106035A12838}" type="datetimeFigureOut">
               <a:rPr lang="en-US" smtClean="0"/>
-              <a:t>12/13/2024</a:t>
+              <a:t>12/16/2024</a:t>
             </a:fld>
             <a:endParaRPr lang="en-US"/>
           </a:p>
@@ -1449,7 +1449,7 @@
           <a:p>
             <a:fld id="{1ABA7A20-74C4-4F60-84AA-106035A12838}" type="datetimeFigureOut">
               <a:rPr lang="en-US" smtClean="0"/>
-              <a:t>12/13/2024</a:t>
+              <a:t>12/16/2024</a:t>
             </a:fld>
             <a:endParaRPr lang="en-US"/>
           </a:p>
@@ -1861,7 +1861,7 @@
           <a:p>
             <a:fld id="{1ABA7A20-74C4-4F60-84AA-106035A12838}" type="datetimeFigureOut">
               <a:rPr lang="en-US" smtClean="0"/>
-              <a:t>12/13/2024</a:t>
+              <a:t>12/16/2024</a:t>
             </a:fld>
             <a:endParaRPr lang="en-US"/>
           </a:p>
@@ -2002,7 +2002,7 @@
           <a:p>
             <a:fld id="{1ABA7A20-74C4-4F60-84AA-106035A12838}" type="datetimeFigureOut">
               <a:rPr lang="en-US" smtClean="0"/>
-              <a:t>12/13/2024</a:t>
+              <a:t>12/16/2024</a:t>
             </a:fld>
             <a:endParaRPr lang="en-US"/>
           </a:p>
@@ -2115,7 +2115,7 @@
           <a:p>
             <a:fld id="{1ABA7A20-74C4-4F60-84AA-106035A12838}" type="datetimeFigureOut">
               <a:rPr lang="en-US" smtClean="0"/>
-              <a:t>12/13/2024</a:t>
+              <a:t>12/16/2024</a:t>
             </a:fld>
             <a:endParaRPr lang="en-US"/>
           </a:p>
@@ -2426,7 +2426,7 @@
           <a:p>
             <a:fld id="{1ABA7A20-74C4-4F60-84AA-106035A12838}" type="datetimeFigureOut">
               <a:rPr lang="en-US" smtClean="0"/>
-              <a:t>12/13/2024</a:t>
+              <a:t>12/16/2024</a:t>
             </a:fld>
             <a:endParaRPr lang="en-US"/>
           </a:p>
@@ -2714,7 +2714,7 @@
           <a:p>
             <a:fld id="{1ABA7A20-74C4-4F60-84AA-106035A12838}" type="datetimeFigureOut">
               <a:rPr lang="en-US" smtClean="0"/>
-              <a:t>12/13/2024</a:t>
+              <a:t>12/16/2024</a:t>
             </a:fld>
             <a:endParaRPr lang="en-US"/>
           </a:p>
@@ -2955,7 +2955,7 @@
           <a:p>
             <a:fld id="{1ABA7A20-74C4-4F60-84AA-106035A12838}" type="datetimeFigureOut">
               <a:rPr lang="en-US" smtClean="0"/>
-              <a:t>12/13/2024</a:t>
+              <a:t>12/16/2024</a:t>
             </a:fld>
             <a:endParaRPr lang="en-US"/>
           </a:p>
@@ -3576,17 +3576,19 @@
         </p:blipFill>
         <p:spPr>
           <a:xfrm>
-            <a:off x="3315393" y="3790293"/>
+            <a:off x="3352800" y="3790293"/>
             <a:ext cx="2743200" cy="2743200"/>
           </a:xfrm>
           <a:prstGeom prst="roundRect">
-            <a:avLst/>
+            <a:avLst>
+              <a:gd name="adj" fmla="val 16552"/>
+            </a:avLst>
           </a:prstGeom>
         </p:spPr>
       </p:pic>
       <p:pic>
         <p:nvPicPr>
-          <p:cNvPr id="13" name="TopCornersRounded">
+          <p:cNvPr id="13" name="TopCornersRoundedRectangle">
             <a:extLst>
               <a:ext uri="{FF2B5EF4-FFF2-40B4-BE49-F238E27FC236}">
                 <a16:creationId xmlns:a16="http://schemas.microsoft.com/office/drawing/2014/main" id="{AA2D0D0E-5C7F-CB73-B525-C05FCE3ABE62}"/>
@@ -3612,17 +3614,20 @@
         </p:blipFill>
         <p:spPr>
           <a:xfrm>
-            <a:off x="6323214" y="3790293"/>
+            <a:off x="6550431" y="3790293"/>
             <a:ext cx="2743200" cy="2743200"/>
           </a:xfrm>
           <a:prstGeom prst="round2SameRect">
-            <a:avLst/>
+            <a:avLst>
+              <a:gd name="adj1" fmla="val 16435"/>
+              <a:gd name="adj2" fmla="val 0"/>
+            </a:avLst>
           </a:prstGeom>
         </p:spPr>
       </p:pic>
       <p:pic>
         <p:nvPicPr>
-          <p:cNvPr id="14" name="Star">
+          <p:cNvPr id="14" name="Star5">
             <a:extLst>
               <a:ext uri="{FF2B5EF4-FFF2-40B4-BE49-F238E27FC236}">
                 <a16:creationId xmlns:a16="http://schemas.microsoft.com/office/drawing/2014/main" id="{8D4B4147-6584-0858-5CAB-6FD6B29C2389}"/>

</xml_diff>